<commit_message>
EDA update, model init
</commit_message>
<xml_diff>
--- a/Presentation.pptx
+++ b/Presentation.pptx
@@ -7,7 +7,8 @@
   <p:sldIdLst>
     <p:sldId id="256" r:id="rId2"/>
     <p:sldId id="257" r:id="rId3"/>
-    <p:sldId id="258" r:id="rId4"/>
+    <p:sldId id="259" r:id="rId4"/>
+    <p:sldId id="258" r:id="rId5"/>
   </p:sldIdLst>
   <p:sldSz cx="12192000" cy="6858000"/>
   <p:notesSz cx="6858000" cy="9144000"/>
@@ -106,6 +107,11 @@
       </a:defRPr>
     </a:lvl9pPr>
   </p:defaultTextStyle>
+  <p:extLst>
+    <p:ext uri="{EFAFB233-063F-42B5-8137-9DF3F51BA10A}">
+      <p15:sldGuideLst xmlns:p15="http://schemas.microsoft.com/office/powerpoint/2012/main"/>
+    </p:ext>
+  </p:extLst>
 </p:presentation>
 </file>
 
@@ -256,7 +262,7 @@
           <a:p>
             <a:fld id="{CE041CD0-0A91-4C74-B9E9-0D4DB84A7C84}" type="datetimeFigureOut">
               <a:rPr lang="en-US" smtClean="0"/>
-              <a:t>6/13/2023</a:t>
+              <a:t>6/14/2023</a:t>
             </a:fld>
             <a:endParaRPr lang="en-US"/>
           </a:p>
@@ -454,7 +460,7 @@
           <a:p>
             <a:fld id="{CE041CD0-0A91-4C74-B9E9-0D4DB84A7C84}" type="datetimeFigureOut">
               <a:rPr lang="en-US" smtClean="0"/>
-              <a:t>6/13/2023</a:t>
+              <a:t>6/14/2023</a:t>
             </a:fld>
             <a:endParaRPr lang="en-US"/>
           </a:p>
@@ -662,7 +668,7 @@
           <a:p>
             <a:fld id="{CE041CD0-0A91-4C74-B9E9-0D4DB84A7C84}" type="datetimeFigureOut">
               <a:rPr lang="en-US" smtClean="0"/>
-              <a:t>6/13/2023</a:t>
+              <a:t>6/14/2023</a:t>
             </a:fld>
             <a:endParaRPr lang="en-US"/>
           </a:p>
@@ -860,7 +866,7 @@
           <a:p>
             <a:fld id="{CE041CD0-0A91-4C74-B9E9-0D4DB84A7C84}" type="datetimeFigureOut">
               <a:rPr lang="en-US" smtClean="0"/>
-              <a:t>6/13/2023</a:t>
+              <a:t>6/14/2023</a:t>
             </a:fld>
             <a:endParaRPr lang="en-US"/>
           </a:p>
@@ -1135,7 +1141,7 @@
           <a:p>
             <a:fld id="{CE041CD0-0A91-4C74-B9E9-0D4DB84A7C84}" type="datetimeFigureOut">
               <a:rPr lang="en-US" smtClean="0"/>
-              <a:t>6/13/2023</a:t>
+              <a:t>6/14/2023</a:t>
             </a:fld>
             <a:endParaRPr lang="en-US"/>
           </a:p>
@@ -1400,7 +1406,7 @@
           <a:p>
             <a:fld id="{CE041CD0-0A91-4C74-B9E9-0D4DB84A7C84}" type="datetimeFigureOut">
               <a:rPr lang="en-US" smtClean="0"/>
-              <a:t>6/13/2023</a:t>
+              <a:t>6/14/2023</a:t>
             </a:fld>
             <a:endParaRPr lang="en-US"/>
           </a:p>
@@ -1812,7 +1818,7 @@
           <a:p>
             <a:fld id="{CE041CD0-0A91-4C74-B9E9-0D4DB84A7C84}" type="datetimeFigureOut">
               <a:rPr lang="en-US" smtClean="0"/>
-              <a:t>6/13/2023</a:t>
+              <a:t>6/14/2023</a:t>
             </a:fld>
             <a:endParaRPr lang="en-US"/>
           </a:p>
@@ -1953,7 +1959,7 @@
           <a:p>
             <a:fld id="{CE041CD0-0A91-4C74-B9E9-0D4DB84A7C84}" type="datetimeFigureOut">
               <a:rPr lang="en-US" smtClean="0"/>
-              <a:t>6/13/2023</a:t>
+              <a:t>6/14/2023</a:t>
             </a:fld>
             <a:endParaRPr lang="en-US"/>
           </a:p>
@@ -2066,7 +2072,7 @@
           <a:p>
             <a:fld id="{CE041CD0-0A91-4C74-B9E9-0D4DB84A7C84}" type="datetimeFigureOut">
               <a:rPr lang="en-US" smtClean="0"/>
-              <a:t>6/13/2023</a:t>
+              <a:t>6/14/2023</a:t>
             </a:fld>
             <a:endParaRPr lang="en-US"/>
           </a:p>
@@ -2377,7 +2383,7 @@
           <a:p>
             <a:fld id="{CE041CD0-0A91-4C74-B9E9-0D4DB84A7C84}" type="datetimeFigureOut">
               <a:rPr lang="en-US" smtClean="0"/>
-              <a:t>6/13/2023</a:t>
+              <a:t>6/14/2023</a:t>
             </a:fld>
             <a:endParaRPr lang="en-US"/>
           </a:p>
@@ -2665,7 +2671,7 @@
           <a:p>
             <a:fld id="{CE041CD0-0A91-4C74-B9E9-0D4DB84A7C84}" type="datetimeFigureOut">
               <a:rPr lang="en-US" smtClean="0"/>
-              <a:t>6/13/2023</a:t>
+              <a:t>6/14/2023</a:t>
             </a:fld>
             <a:endParaRPr lang="en-US"/>
           </a:p>
@@ -2906,7 +2912,7 @@
           <a:p>
             <a:fld id="{CE041CD0-0A91-4C74-B9E9-0D4DB84A7C84}" type="datetimeFigureOut">
               <a:rPr lang="en-US" smtClean="0"/>
-              <a:t>6/13/2023</a:t>
+              <a:t>6/14/2023</a:t>
             </a:fld>
             <a:endParaRPr lang="en-US"/>
           </a:p>
@@ -6854,6 +6860,76 @@
           </a:p>
         </p:txBody>
       </p:sp>
+      <p:sp>
+        <p:nvSpPr>
+          <p:cNvPr id="2" name="TextBox 1">
+            <a:extLst>
+              <a:ext uri="{FF2B5EF4-FFF2-40B4-BE49-F238E27FC236}">
+                <a16:creationId xmlns:a16="http://schemas.microsoft.com/office/drawing/2014/main" id="{37F2A279-49DE-3BC1-9FBE-CFDDA6E48191}"/>
+              </a:ext>
+            </a:extLst>
+          </p:cNvPr>
+          <p:cNvSpPr txBox="1"/>
+          <p:nvPr/>
+        </p:nvSpPr>
+        <p:spPr>
+          <a:xfrm>
+            <a:off x="9308841" y="1376747"/>
+            <a:ext cx="1670479" cy="646331"/>
+          </a:xfrm>
+          <a:prstGeom prst="rect">
+            <a:avLst/>
+          </a:prstGeom>
+          <a:noFill/>
+        </p:spPr>
+        <p:txBody>
+          <a:bodyPr wrap="square" rtlCol="0">
+            <a:spAutoFit/>
+          </a:bodyPr>
+          <a:lstStyle/>
+          <a:p>
+            <a:r>
+              <a:rPr lang="en-US" dirty="0"/>
+              <a:t>Those have QC test results</a:t>
+            </a:r>
+          </a:p>
+        </p:txBody>
+      </p:sp>
+      <p:sp>
+        <p:nvSpPr>
+          <p:cNvPr id="3" name="TextBox 2">
+            <a:extLst>
+              <a:ext uri="{FF2B5EF4-FFF2-40B4-BE49-F238E27FC236}">
+                <a16:creationId xmlns:a16="http://schemas.microsoft.com/office/drawing/2014/main" id="{99454B88-5B03-B223-6F5F-1094314D4101}"/>
+              </a:ext>
+            </a:extLst>
+          </p:cNvPr>
+          <p:cNvSpPr txBox="1"/>
+          <p:nvPr/>
+        </p:nvSpPr>
+        <p:spPr>
+          <a:xfrm>
+            <a:off x="10376262" y="2449324"/>
+            <a:ext cx="1670479" cy="646331"/>
+          </a:xfrm>
+          <a:prstGeom prst="rect">
+            <a:avLst/>
+          </a:prstGeom>
+          <a:noFill/>
+        </p:spPr>
+        <p:txBody>
+          <a:bodyPr wrap="square" rtlCol="0">
+            <a:spAutoFit/>
+          </a:bodyPr>
+          <a:lstStyle/>
+          <a:p>
+            <a:r>
+              <a:rPr lang="en-US" dirty="0"/>
+              <a:t>Those have QC test results</a:t>
+            </a:r>
+          </a:p>
+        </p:txBody>
+      </p:sp>
     </p:spTree>
     <p:extLst>
       <p:ext uri="{BB962C8B-B14F-4D97-AF65-F5344CB8AC3E}">
@@ -6868,6 +6944,80 @@
 </file>
 
 <file path=ppt/slides/slide3.xml><?xml version="1.0" encoding="utf-8"?>
+<p:sld xmlns:a="http://schemas.openxmlformats.org/drawingml/2006/main" xmlns:r="http://schemas.openxmlformats.org/officeDocument/2006/relationships" xmlns:p="http://schemas.openxmlformats.org/presentationml/2006/main">
+  <p:cSld>
+    <p:spTree>
+      <p:nvGrpSpPr>
+        <p:cNvPr id="1" name=""/>
+        <p:cNvGrpSpPr/>
+        <p:nvPr/>
+      </p:nvGrpSpPr>
+      <p:grpSpPr>
+        <a:xfrm>
+          <a:off x="0" y="0"/>
+          <a:ext cx="0" cy="0"/>
+          <a:chOff x="0" y="0"/>
+          <a:chExt cx="0" cy="0"/>
+        </a:xfrm>
+      </p:grpSpPr>
+      <p:sp>
+        <p:nvSpPr>
+          <p:cNvPr id="4" name="TextBox 3">
+            <a:extLst>
+              <a:ext uri="{FF2B5EF4-FFF2-40B4-BE49-F238E27FC236}">
+                <a16:creationId xmlns:a16="http://schemas.microsoft.com/office/drawing/2014/main" id="{D38F2A48-6081-8BA3-9C35-0857BF134BC1}"/>
+              </a:ext>
+            </a:extLst>
+          </p:cNvPr>
+          <p:cNvSpPr txBox="1"/>
+          <p:nvPr/>
+        </p:nvSpPr>
+        <p:spPr>
+          <a:xfrm>
+            <a:off x="1054359" y="755780"/>
+            <a:ext cx="5579706" cy="923330"/>
+          </a:xfrm>
+          <a:prstGeom prst="rect">
+            <a:avLst/>
+          </a:prstGeom>
+          <a:noFill/>
+        </p:spPr>
+        <p:txBody>
+          <a:bodyPr wrap="square" rtlCol="0">
+            <a:spAutoFit/>
+          </a:bodyPr>
+          <a:lstStyle/>
+          <a:p>
+            <a:r>
+              <a:rPr lang="en-US" dirty="0"/>
+              <a:t>How many Output Batches :</a:t>
+            </a:r>
+          </a:p>
+          <a:p>
+            <a:r>
+              <a:rPr lang="en-US" dirty="0"/>
+              <a:t>Average </a:t>
+            </a:r>
+          </a:p>
+          <a:p>
+            <a:endParaRPr lang="en-US" dirty="0"/>
+          </a:p>
+        </p:txBody>
+      </p:sp>
+    </p:spTree>
+    <p:extLst>
+      <p:ext uri="{BB962C8B-B14F-4D97-AF65-F5344CB8AC3E}">
+        <p14:creationId xmlns:p14="http://schemas.microsoft.com/office/powerpoint/2010/main" val="1533247011"/>
+      </p:ext>
+    </p:extLst>
+  </p:cSld>
+  <p:clrMapOvr>
+    <a:masterClrMapping/>
+  </p:clrMapOvr>
+</p:sld>
+</file>
+
+<file path=ppt/slides/slide4.xml><?xml version="1.0" encoding="utf-8"?>
 <p:sld xmlns:a="http://schemas.openxmlformats.org/drawingml/2006/main" xmlns:r="http://schemas.openxmlformats.org/officeDocument/2006/relationships" xmlns:p="http://schemas.openxmlformats.org/presentationml/2006/main">
   <p:cSld>
     <p:spTree>

</xml_diff>

<commit_message>
EDA analysis added, presentation update
</commit_message>
<xml_diff>
--- a/Presentation.pptx
+++ b/Presentation.pptx
@@ -4,11 +4,17 @@
   <p:sldMasterIdLst>
     <p:sldMasterId id="2147483648" r:id="rId1"/>
   </p:sldMasterIdLst>
+  <p:notesMasterIdLst>
+    <p:notesMasterId r:id="rId9"/>
+  </p:notesMasterIdLst>
   <p:sldIdLst>
     <p:sldId id="256" r:id="rId2"/>
     <p:sldId id="257" r:id="rId3"/>
-    <p:sldId id="260" r:id="rId4"/>
-    <p:sldId id="258" r:id="rId5"/>
+    <p:sldId id="261" r:id="rId4"/>
+    <p:sldId id="262" r:id="rId5"/>
+    <p:sldId id="260" r:id="rId6"/>
+    <p:sldId id="263" r:id="rId7"/>
+    <p:sldId id="258" r:id="rId8"/>
   </p:sldIdLst>
   <p:sldSz cx="12192000" cy="6858000"/>
   <p:notesSz cx="6858000" cy="9144000"/>
@@ -113,6 +119,451 @@
     </p:ext>
   </p:extLst>
 </p:presentation>
+</file>
+
+<file path=ppt/notesMasters/notesMaster1.xml><?xml version="1.0" encoding="utf-8"?>
+<p:notesMaster xmlns:a="http://schemas.openxmlformats.org/drawingml/2006/main" xmlns:r="http://schemas.openxmlformats.org/officeDocument/2006/relationships" xmlns:p="http://schemas.openxmlformats.org/presentationml/2006/main">
+  <p:cSld>
+    <p:bg>
+      <p:bgRef idx="1001">
+        <a:schemeClr val="bg1"/>
+      </p:bgRef>
+    </p:bg>
+    <p:spTree>
+      <p:nvGrpSpPr>
+        <p:cNvPr id="1" name=""/>
+        <p:cNvGrpSpPr/>
+        <p:nvPr/>
+      </p:nvGrpSpPr>
+      <p:grpSpPr>
+        <a:xfrm>
+          <a:off x="0" y="0"/>
+          <a:ext cx="0" cy="0"/>
+          <a:chOff x="0" y="0"/>
+          <a:chExt cx="0" cy="0"/>
+        </a:xfrm>
+      </p:grpSpPr>
+      <p:sp>
+        <p:nvSpPr>
+          <p:cNvPr id="2" name="Header Placeholder 1"/>
+          <p:cNvSpPr>
+            <a:spLocks noGrp="1"/>
+          </p:cNvSpPr>
+          <p:nvPr>
+            <p:ph type="hdr" sz="quarter"/>
+          </p:nvPr>
+        </p:nvSpPr>
+        <p:spPr>
+          <a:xfrm>
+            <a:off x="0" y="0"/>
+            <a:ext cx="2971800" cy="458788"/>
+          </a:xfrm>
+          <a:prstGeom prst="rect">
+            <a:avLst/>
+          </a:prstGeom>
+        </p:spPr>
+        <p:txBody>
+          <a:bodyPr vert="horz" lIns="91440" tIns="45720" rIns="91440" bIns="45720" rtlCol="0"/>
+          <a:lstStyle>
+            <a:lvl1pPr algn="l">
+              <a:defRPr sz="1200"/>
+            </a:lvl1pPr>
+          </a:lstStyle>
+          <a:p>
+            <a:endParaRPr lang="en-US"/>
+          </a:p>
+        </p:txBody>
+      </p:sp>
+      <p:sp>
+        <p:nvSpPr>
+          <p:cNvPr id="3" name="Date Placeholder 2"/>
+          <p:cNvSpPr>
+            <a:spLocks noGrp="1"/>
+          </p:cNvSpPr>
+          <p:nvPr>
+            <p:ph type="dt" idx="1"/>
+          </p:nvPr>
+        </p:nvSpPr>
+        <p:spPr>
+          <a:xfrm>
+            <a:off x="3884613" y="0"/>
+            <a:ext cx="2971800" cy="458788"/>
+          </a:xfrm>
+          <a:prstGeom prst="rect">
+            <a:avLst/>
+          </a:prstGeom>
+        </p:spPr>
+        <p:txBody>
+          <a:bodyPr vert="horz" lIns="91440" tIns="45720" rIns="91440" bIns="45720" rtlCol="0"/>
+          <a:lstStyle>
+            <a:lvl1pPr algn="r">
+              <a:defRPr sz="1200"/>
+            </a:lvl1pPr>
+          </a:lstStyle>
+          <a:p>
+            <a:fld id="{C3553693-AB9B-429C-8709-86A036835999}" type="datetimeFigureOut">
+              <a:rPr lang="en-US" smtClean="0"/>
+              <a:t>6/18/2023</a:t>
+            </a:fld>
+            <a:endParaRPr lang="en-US"/>
+          </a:p>
+        </p:txBody>
+      </p:sp>
+      <p:sp>
+        <p:nvSpPr>
+          <p:cNvPr id="4" name="Slide Image Placeholder 3"/>
+          <p:cNvSpPr>
+            <a:spLocks noGrp="1" noRot="1" noChangeAspect="1"/>
+          </p:cNvSpPr>
+          <p:nvPr>
+            <p:ph type="sldImg" idx="2"/>
+          </p:nvPr>
+        </p:nvSpPr>
+        <p:spPr>
+          <a:xfrm>
+            <a:off x="685800" y="1143000"/>
+            <a:ext cx="5486400" cy="3086100"/>
+          </a:xfrm>
+          <a:prstGeom prst="rect">
+            <a:avLst/>
+          </a:prstGeom>
+          <a:noFill/>
+          <a:ln w="12700">
+            <a:solidFill>
+              <a:prstClr val="black"/>
+            </a:solidFill>
+          </a:ln>
+        </p:spPr>
+        <p:txBody>
+          <a:bodyPr vert="horz" lIns="91440" tIns="45720" rIns="91440" bIns="45720" rtlCol="0" anchor="ctr"/>
+          <a:lstStyle/>
+          <a:p>
+            <a:endParaRPr lang="en-US"/>
+          </a:p>
+        </p:txBody>
+      </p:sp>
+      <p:sp>
+        <p:nvSpPr>
+          <p:cNvPr id="5" name="Notes Placeholder 4"/>
+          <p:cNvSpPr>
+            <a:spLocks noGrp="1"/>
+          </p:cNvSpPr>
+          <p:nvPr>
+            <p:ph type="body" sz="quarter" idx="3"/>
+          </p:nvPr>
+        </p:nvSpPr>
+        <p:spPr>
+          <a:xfrm>
+            <a:off x="685800" y="4400550"/>
+            <a:ext cx="5486400" cy="3600450"/>
+          </a:xfrm>
+          <a:prstGeom prst="rect">
+            <a:avLst/>
+          </a:prstGeom>
+        </p:spPr>
+        <p:txBody>
+          <a:bodyPr vert="horz" lIns="91440" tIns="45720" rIns="91440" bIns="45720" rtlCol="0"/>
+          <a:lstStyle/>
+          <a:p>
+            <a:pPr lvl="0"/>
+            <a:r>
+              <a:rPr lang="en-US"/>
+              <a:t>Click to edit Master text styles</a:t>
+            </a:r>
+          </a:p>
+          <a:p>
+            <a:pPr lvl="1"/>
+            <a:r>
+              <a:rPr lang="en-US"/>
+              <a:t>Second level</a:t>
+            </a:r>
+          </a:p>
+          <a:p>
+            <a:pPr lvl="2"/>
+            <a:r>
+              <a:rPr lang="en-US"/>
+              <a:t>Third level</a:t>
+            </a:r>
+          </a:p>
+          <a:p>
+            <a:pPr lvl="3"/>
+            <a:r>
+              <a:rPr lang="en-US"/>
+              <a:t>Fourth level</a:t>
+            </a:r>
+          </a:p>
+          <a:p>
+            <a:pPr lvl="4"/>
+            <a:r>
+              <a:rPr lang="en-US"/>
+              <a:t>Fifth level</a:t>
+            </a:r>
+          </a:p>
+        </p:txBody>
+      </p:sp>
+      <p:sp>
+        <p:nvSpPr>
+          <p:cNvPr id="6" name="Footer Placeholder 5"/>
+          <p:cNvSpPr>
+            <a:spLocks noGrp="1"/>
+          </p:cNvSpPr>
+          <p:nvPr>
+            <p:ph type="ftr" sz="quarter" idx="4"/>
+          </p:nvPr>
+        </p:nvSpPr>
+        <p:spPr>
+          <a:xfrm>
+            <a:off x="0" y="8685213"/>
+            <a:ext cx="2971800" cy="458787"/>
+          </a:xfrm>
+          <a:prstGeom prst="rect">
+            <a:avLst/>
+          </a:prstGeom>
+        </p:spPr>
+        <p:txBody>
+          <a:bodyPr vert="horz" lIns="91440" tIns="45720" rIns="91440" bIns="45720" rtlCol="0" anchor="b"/>
+          <a:lstStyle>
+            <a:lvl1pPr algn="l">
+              <a:defRPr sz="1200"/>
+            </a:lvl1pPr>
+          </a:lstStyle>
+          <a:p>
+            <a:endParaRPr lang="en-US"/>
+          </a:p>
+        </p:txBody>
+      </p:sp>
+      <p:sp>
+        <p:nvSpPr>
+          <p:cNvPr id="7" name="Slide Number Placeholder 6"/>
+          <p:cNvSpPr>
+            <a:spLocks noGrp="1"/>
+          </p:cNvSpPr>
+          <p:nvPr>
+            <p:ph type="sldNum" sz="quarter" idx="5"/>
+          </p:nvPr>
+        </p:nvSpPr>
+        <p:spPr>
+          <a:xfrm>
+            <a:off x="3884613" y="8685213"/>
+            <a:ext cx="2971800" cy="458787"/>
+          </a:xfrm>
+          <a:prstGeom prst="rect">
+            <a:avLst/>
+          </a:prstGeom>
+        </p:spPr>
+        <p:txBody>
+          <a:bodyPr vert="horz" lIns="91440" tIns="45720" rIns="91440" bIns="45720" rtlCol="0" anchor="b"/>
+          <a:lstStyle>
+            <a:lvl1pPr algn="r">
+              <a:defRPr sz="1200"/>
+            </a:lvl1pPr>
+          </a:lstStyle>
+          <a:p>
+            <a:fld id="{C461FFCA-95CF-4E66-99E8-1A656E25CDB7}" type="slidenum">
+              <a:rPr lang="en-US" smtClean="0"/>
+              <a:t>‹#›</a:t>
+            </a:fld>
+            <a:endParaRPr lang="en-US"/>
+          </a:p>
+        </p:txBody>
+      </p:sp>
+    </p:spTree>
+    <p:extLst>
+      <p:ext uri="{BB962C8B-B14F-4D97-AF65-F5344CB8AC3E}">
+        <p14:creationId xmlns:p14="http://schemas.microsoft.com/office/powerpoint/2010/main" val="789035178"/>
+      </p:ext>
+    </p:extLst>
+  </p:cSld>
+  <p:clrMap bg1="lt1" tx1="dk1" bg2="lt2" tx2="dk2" accent1="accent1" accent2="accent2" accent3="accent3" accent4="accent4" accent5="accent5" accent6="accent6" hlink="hlink" folHlink="folHlink"/>
+  <p:notesStyle>
+    <a:lvl1pPr marL="0" algn="l" defTabSz="914400" rtl="0" eaLnBrk="1" latinLnBrk="0" hangingPunct="1">
+      <a:defRPr sz="1200" kern="1200">
+        <a:solidFill>
+          <a:schemeClr val="tx1"/>
+        </a:solidFill>
+        <a:latin typeface="+mn-lt"/>
+        <a:ea typeface="+mn-ea"/>
+        <a:cs typeface="+mn-cs"/>
+      </a:defRPr>
+    </a:lvl1pPr>
+    <a:lvl2pPr marL="457200" algn="l" defTabSz="914400" rtl="0" eaLnBrk="1" latinLnBrk="0" hangingPunct="1">
+      <a:defRPr sz="1200" kern="1200">
+        <a:solidFill>
+          <a:schemeClr val="tx1"/>
+        </a:solidFill>
+        <a:latin typeface="+mn-lt"/>
+        <a:ea typeface="+mn-ea"/>
+        <a:cs typeface="+mn-cs"/>
+      </a:defRPr>
+    </a:lvl2pPr>
+    <a:lvl3pPr marL="914400" algn="l" defTabSz="914400" rtl="0" eaLnBrk="1" latinLnBrk="0" hangingPunct="1">
+      <a:defRPr sz="1200" kern="1200">
+        <a:solidFill>
+          <a:schemeClr val="tx1"/>
+        </a:solidFill>
+        <a:latin typeface="+mn-lt"/>
+        <a:ea typeface="+mn-ea"/>
+        <a:cs typeface="+mn-cs"/>
+      </a:defRPr>
+    </a:lvl3pPr>
+    <a:lvl4pPr marL="1371600" algn="l" defTabSz="914400" rtl="0" eaLnBrk="1" latinLnBrk="0" hangingPunct="1">
+      <a:defRPr sz="1200" kern="1200">
+        <a:solidFill>
+          <a:schemeClr val="tx1"/>
+        </a:solidFill>
+        <a:latin typeface="+mn-lt"/>
+        <a:ea typeface="+mn-ea"/>
+        <a:cs typeface="+mn-cs"/>
+      </a:defRPr>
+    </a:lvl4pPr>
+    <a:lvl5pPr marL="1828800" algn="l" defTabSz="914400" rtl="0" eaLnBrk="1" latinLnBrk="0" hangingPunct="1">
+      <a:defRPr sz="1200" kern="1200">
+        <a:solidFill>
+          <a:schemeClr val="tx1"/>
+        </a:solidFill>
+        <a:latin typeface="+mn-lt"/>
+        <a:ea typeface="+mn-ea"/>
+        <a:cs typeface="+mn-cs"/>
+      </a:defRPr>
+    </a:lvl5pPr>
+    <a:lvl6pPr marL="2286000" algn="l" defTabSz="914400" rtl="0" eaLnBrk="1" latinLnBrk="0" hangingPunct="1">
+      <a:defRPr sz="1200" kern="1200">
+        <a:solidFill>
+          <a:schemeClr val="tx1"/>
+        </a:solidFill>
+        <a:latin typeface="+mn-lt"/>
+        <a:ea typeface="+mn-ea"/>
+        <a:cs typeface="+mn-cs"/>
+      </a:defRPr>
+    </a:lvl6pPr>
+    <a:lvl7pPr marL="2743200" algn="l" defTabSz="914400" rtl="0" eaLnBrk="1" latinLnBrk="0" hangingPunct="1">
+      <a:defRPr sz="1200" kern="1200">
+        <a:solidFill>
+          <a:schemeClr val="tx1"/>
+        </a:solidFill>
+        <a:latin typeface="+mn-lt"/>
+        <a:ea typeface="+mn-ea"/>
+        <a:cs typeface="+mn-cs"/>
+      </a:defRPr>
+    </a:lvl7pPr>
+    <a:lvl8pPr marL="3200400" algn="l" defTabSz="914400" rtl="0" eaLnBrk="1" latinLnBrk="0" hangingPunct="1">
+      <a:defRPr sz="1200" kern="1200">
+        <a:solidFill>
+          <a:schemeClr val="tx1"/>
+        </a:solidFill>
+        <a:latin typeface="+mn-lt"/>
+        <a:ea typeface="+mn-ea"/>
+        <a:cs typeface="+mn-cs"/>
+      </a:defRPr>
+    </a:lvl8pPr>
+    <a:lvl9pPr marL="3657600" algn="l" defTabSz="914400" rtl="0" eaLnBrk="1" latinLnBrk="0" hangingPunct="1">
+      <a:defRPr sz="1200" kern="1200">
+        <a:solidFill>
+          <a:schemeClr val="tx1"/>
+        </a:solidFill>
+        <a:latin typeface="+mn-lt"/>
+        <a:ea typeface="+mn-ea"/>
+        <a:cs typeface="+mn-cs"/>
+      </a:defRPr>
+    </a:lvl9pPr>
+  </p:notesStyle>
+</p:notesMaster>
+</file>
+
+<file path=ppt/notesSlides/notesSlide1.xml><?xml version="1.0" encoding="utf-8"?>
+<p:notes xmlns:a="http://schemas.openxmlformats.org/drawingml/2006/main" xmlns:r="http://schemas.openxmlformats.org/officeDocument/2006/relationships" xmlns:p="http://schemas.openxmlformats.org/presentationml/2006/main">
+  <p:cSld>
+    <p:spTree>
+      <p:nvGrpSpPr>
+        <p:cNvPr id="1" name=""/>
+        <p:cNvGrpSpPr/>
+        <p:nvPr/>
+      </p:nvGrpSpPr>
+      <p:grpSpPr>
+        <a:xfrm>
+          <a:off x="0" y="0"/>
+          <a:ext cx="0" cy="0"/>
+          <a:chOff x="0" y="0"/>
+          <a:chExt cx="0" cy="0"/>
+        </a:xfrm>
+      </p:grpSpPr>
+      <p:sp>
+        <p:nvSpPr>
+          <p:cNvPr id="2" name="Slide Image Placeholder 1"/>
+          <p:cNvSpPr>
+            <a:spLocks noGrp="1" noRot="1" noChangeAspect="1"/>
+          </p:cNvSpPr>
+          <p:nvPr>
+            <p:ph type="sldImg"/>
+          </p:nvPr>
+        </p:nvSpPr>
+        <p:spPr/>
+      </p:sp>
+      <p:sp>
+        <p:nvSpPr>
+          <p:cNvPr id="3" name="Notes Placeholder 2"/>
+          <p:cNvSpPr>
+            <a:spLocks noGrp="1"/>
+          </p:cNvSpPr>
+          <p:nvPr>
+            <p:ph type="body" idx="1"/>
+          </p:nvPr>
+        </p:nvSpPr>
+        <p:spPr/>
+        <p:txBody>
+          <a:bodyPr/>
+          <a:lstStyle/>
+          <a:p>
+            <a:r>
+              <a:rPr lang="en-US" dirty="0"/>
+              <a:t>Non-parametric models are flexible modeling techniques that do not assume a specific functional form for the relationship between predictors and the response variable. These models make fewer assumptions about the underlying distribution of the data and can be more robust to violations of normality. Non-parametric models include techniques like decision trees, random forests, support vector machines, and neural networks. These models can capture complex relationships without explicitly assuming a specific distribution.</a:t>
+            </a:r>
+          </a:p>
+          <a:p>
+            <a:endParaRPr lang="en-US" dirty="0"/>
+          </a:p>
+          <a:p>
+            <a:r>
+              <a:rPr lang="en-US" dirty="0"/>
+              <a:t>GLMs are an extension of linear regression models that allow for non-normal response variables and account for different types of distributions. GLMs relax the assumption of normally distributed residuals and instead assume a specific distribution from the exponential family, such as binomial, Poisson, or gamma distributions. This allows for modeling various types of response variables, such as binary, count, or skewed continuous variables.</a:t>
+            </a:r>
+          </a:p>
+        </p:txBody>
+      </p:sp>
+      <p:sp>
+        <p:nvSpPr>
+          <p:cNvPr id="4" name="Slide Number Placeholder 3"/>
+          <p:cNvSpPr>
+            <a:spLocks noGrp="1"/>
+          </p:cNvSpPr>
+          <p:nvPr>
+            <p:ph type="sldNum" sz="quarter" idx="5"/>
+          </p:nvPr>
+        </p:nvSpPr>
+        <p:spPr/>
+        <p:txBody>
+          <a:bodyPr/>
+          <a:lstStyle/>
+          <a:p>
+            <a:fld id="{C461FFCA-95CF-4E66-99E8-1A656E25CDB7}" type="slidenum">
+              <a:rPr lang="en-US" smtClean="0"/>
+              <a:t>4</a:t>
+            </a:fld>
+            <a:endParaRPr lang="en-US"/>
+          </a:p>
+        </p:txBody>
+      </p:sp>
+    </p:spTree>
+    <p:extLst>
+      <p:ext uri="{BB962C8B-B14F-4D97-AF65-F5344CB8AC3E}">
+        <p14:creationId xmlns:p14="http://schemas.microsoft.com/office/powerpoint/2010/main" val="3939999059"/>
+      </p:ext>
+    </p:extLst>
+  </p:cSld>
+  <p:clrMapOvr>
+    <a:masterClrMapping/>
+  </p:clrMapOvr>
+</p:notes>
 </file>
 
 <file path=ppt/slideLayouts/slideLayout1.xml><?xml version="1.0" encoding="utf-8"?>
@@ -6874,38 +7325,10 @@
       </p:grpSpPr>
       <p:sp>
         <p:nvSpPr>
-          <p:cNvPr id="2" name="Title 1">
-            <a:extLst>
-              <a:ext uri="{FF2B5EF4-FFF2-40B4-BE49-F238E27FC236}">
-                <a16:creationId xmlns:a16="http://schemas.microsoft.com/office/drawing/2014/main" id="{30DEED32-9FBA-634F-C08D-285CB9957E4B}"/>
-              </a:ext>
-            </a:extLst>
-          </p:cNvPr>
-          <p:cNvSpPr>
-            <a:spLocks noGrp="1"/>
-          </p:cNvSpPr>
-          <p:nvPr>
-            <p:ph type="title"/>
-          </p:nvPr>
-        </p:nvSpPr>
-        <p:spPr/>
-        <p:txBody>
-          <a:bodyPr/>
-          <a:lstStyle/>
-          <a:p>
-            <a:r>
-              <a:rPr lang="en-US" dirty="0"/>
-              <a:t>EDA</a:t>
-            </a:r>
-          </a:p>
-        </p:txBody>
-      </p:sp>
-      <p:sp>
-        <p:nvSpPr>
           <p:cNvPr id="3" name="Content Placeholder 2">
             <a:extLst>
               <a:ext uri="{FF2B5EF4-FFF2-40B4-BE49-F238E27FC236}">
-                <a16:creationId xmlns:a16="http://schemas.microsoft.com/office/drawing/2014/main" id="{72D38645-BCD0-899A-10A5-E8D510F7A30D}"/>
+                <a16:creationId xmlns:a16="http://schemas.microsoft.com/office/drawing/2014/main" id="{D62E4DE3-09F8-2062-ABAB-F06968A6B30F}"/>
               </a:ext>
             </a:extLst>
           </p:cNvPr>
@@ -6916,12 +7339,643 @@
             <p:ph idx="1"/>
           </p:nvPr>
         </p:nvSpPr>
-        <p:spPr/>
+        <p:spPr>
+          <a:xfrm>
+            <a:off x="838200" y="326572"/>
+            <a:ext cx="10515600" cy="1473654"/>
+          </a:xfrm>
+        </p:spPr>
         <p:txBody>
           <a:bodyPr/>
           <a:lstStyle/>
           <a:p>
-            <a:endParaRPr lang="en-US"/>
+            <a:r>
+              <a:rPr lang="en-US" dirty="0"/>
+              <a:t>All metrics and raw data inputs are aggregated to the BATCH_ID+MATERIAL_ID level So, I will combine those two column into one ID column. It refers a production unit in process. (</a:t>
+            </a:r>
+            <a:r>
+              <a:rPr lang="en-US" dirty="0" err="1"/>
+              <a:t>new_id</a:t>
+            </a:r>
+            <a:r>
+              <a:rPr lang="en-US" dirty="0"/>
+              <a:t>)</a:t>
+            </a:r>
+          </a:p>
+          <a:p>
+            <a:pPr marL="0" indent="0">
+              <a:buNone/>
+            </a:pPr>
+            <a:endParaRPr lang="en-US" dirty="0"/>
+          </a:p>
+        </p:txBody>
+      </p:sp>
+      <p:pic>
+        <p:nvPicPr>
+          <p:cNvPr id="5" name="Picture 4">
+            <a:extLst>
+              <a:ext uri="{FF2B5EF4-FFF2-40B4-BE49-F238E27FC236}">
+                <a16:creationId xmlns:a16="http://schemas.microsoft.com/office/drawing/2014/main" id="{A3E6B98C-24D8-2ED1-9044-70CA0E1E83CB}"/>
+              </a:ext>
+            </a:extLst>
+          </p:cNvPr>
+          <p:cNvPicPr>
+            <a:picLocks noChangeAspect="1"/>
+          </p:cNvPicPr>
+          <p:nvPr/>
+        </p:nvPicPr>
+        <p:blipFill rotWithShape="1">
+          <a:blip r:embed="rId2"/>
+          <a:srcRect l="27031" t="45030" r="53360" b="15588"/>
+          <a:stretch/>
+        </p:blipFill>
+        <p:spPr>
+          <a:xfrm>
+            <a:off x="4352925" y="1800226"/>
+            <a:ext cx="2847975" cy="3038550"/>
+          </a:xfrm>
+          <a:prstGeom prst="rect">
+            <a:avLst/>
+          </a:prstGeom>
+        </p:spPr>
+      </p:pic>
+      <p:sp>
+        <p:nvSpPr>
+          <p:cNvPr id="6" name="Content Placeholder 2">
+            <a:extLst>
+              <a:ext uri="{FF2B5EF4-FFF2-40B4-BE49-F238E27FC236}">
+                <a16:creationId xmlns:a16="http://schemas.microsoft.com/office/drawing/2014/main" id="{7F41E06F-B224-622B-02C4-80B7C375BC70}"/>
+              </a:ext>
+            </a:extLst>
+          </p:cNvPr>
+          <p:cNvSpPr txBox="1">
+            <a:spLocks/>
+          </p:cNvSpPr>
+          <p:nvPr/>
+        </p:nvSpPr>
+        <p:spPr>
+          <a:xfrm>
+            <a:off x="1038225" y="5143499"/>
+            <a:ext cx="10515600" cy="1387929"/>
+          </a:xfrm>
+          <a:prstGeom prst="rect">
+            <a:avLst/>
+          </a:prstGeom>
+        </p:spPr>
+        <p:txBody>
+          <a:bodyPr vert="horz" lIns="91440" tIns="45720" rIns="91440" bIns="45720" rtlCol="0">
+            <a:normAutofit fontScale="92500" lnSpcReduction="20000"/>
+          </a:bodyPr>
+          <a:lstStyle>
+            <a:lvl1pPr marL="228600" indent="-228600" algn="l" defTabSz="914400" rtl="0" eaLnBrk="1" latinLnBrk="0" hangingPunct="1">
+              <a:lnSpc>
+                <a:spcPct val="90000"/>
+              </a:lnSpc>
+              <a:spcBef>
+                <a:spcPts val="1000"/>
+              </a:spcBef>
+              <a:buFont typeface="Arial" panose="020B0604020202020204" pitchFamily="34" charset="0"/>
+              <a:buChar char="•"/>
+              <a:defRPr sz="2800" kern="1200">
+                <a:solidFill>
+                  <a:schemeClr val="tx1"/>
+                </a:solidFill>
+                <a:latin typeface="+mn-lt"/>
+                <a:ea typeface="+mn-ea"/>
+                <a:cs typeface="+mn-cs"/>
+              </a:defRPr>
+            </a:lvl1pPr>
+            <a:lvl2pPr marL="685800" indent="-228600" algn="l" defTabSz="914400" rtl="0" eaLnBrk="1" latinLnBrk="0" hangingPunct="1">
+              <a:lnSpc>
+                <a:spcPct val="90000"/>
+              </a:lnSpc>
+              <a:spcBef>
+                <a:spcPts val="500"/>
+              </a:spcBef>
+              <a:buFont typeface="Arial" panose="020B0604020202020204" pitchFamily="34" charset="0"/>
+              <a:buChar char="•"/>
+              <a:defRPr sz="2400" kern="1200">
+                <a:solidFill>
+                  <a:schemeClr val="tx1"/>
+                </a:solidFill>
+                <a:latin typeface="+mn-lt"/>
+                <a:ea typeface="+mn-ea"/>
+                <a:cs typeface="+mn-cs"/>
+              </a:defRPr>
+            </a:lvl2pPr>
+            <a:lvl3pPr marL="1143000" indent="-228600" algn="l" defTabSz="914400" rtl="0" eaLnBrk="1" latinLnBrk="0" hangingPunct="1">
+              <a:lnSpc>
+                <a:spcPct val="90000"/>
+              </a:lnSpc>
+              <a:spcBef>
+                <a:spcPts val="500"/>
+              </a:spcBef>
+              <a:buFont typeface="Arial" panose="020B0604020202020204" pitchFamily="34" charset="0"/>
+              <a:buChar char="•"/>
+              <a:defRPr sz="2000" kern="1200">
+                <a:solidFill>
+                  <a:schemeClr val="tx1"/>
+                </a:solidFill>
+                <a:latin typeface="+mn-lt"/>
+                <a:ea typeface="+mn-ea"/>
+                <a:cs typeface="+mn-cs"/>
+              </a:defRPr>
+            </a:lvl3pPr>
+            <a:lvl4pPr marL="1600200" indent="-228600" algn="l" defTabSz="914400" rtl="0" eaLnBrk="1" latinLnBrk="0" hangingPunct="1">
+              <a:lnSpc>
+                <a:spcPct val="90000"/>
+              </a:lnSpc>
+              <a:spcBef>
+                <a:spcPts val="500"/>
+              </a:spcBef>
+              <a:buFont typeface="Arial" panose="020B0604020202020204" pitchFamily="34" charset="0"/>
+              <a:buChar char="•"/>
+              <a:defRPr sz="1800" kern="1200">
+                <a:solidFill>
+                  <a:schemeClr val="tx1"/>
+                </a:solidFill>
+                <a:latin typeface="+mn-lt"/>
+                <a:ea typeface="+mn-ea"/>
+                <a:cs typeface="+mn-cs"/>
+              </a:defRPr>
+            </a:lvl4pPr>
+            <a:lvl5pPr marL="2057400" indent="-228600" algn="l" defTabSz="914400" rtl="0" eaLnBrk="1" latinLnBrk="0" hangingPunct="1">
+              <a:lnSpc>
+                <a:spcPct val="90000"/>
+              </a:lnSpc>
+              <a:spcBef>
+                <a:spcPts val="500"/>
+              </a:spcBef>
+              <a:buFont typeface="Arial" panose="020B0604020202020204" pitchFamily="34" charset="0"/>
+              <a:buChar char="•"/>
+              <a:defRPr sz="1800" kern="1200">
+                <a:solidFill>
+                  <a:schemeClr val="tx1"/>
+                </a:solidFill>
+                <a:latin typeface="+mn-lt"/>
+                <a:ea typeface="+mn-ea"/>
+                <a:cs typeface="+mn-cs"/>
+              </a:defRPr>
+            </a:lvl5pPr>
+            <a:lvl6pPr marL="2514600" indent="-228600" algn="l" defTabSz="914400" rtl="0" eaLnBrk="1" latinLnBrk="0" hangingPunct="1">
+              <a:lnSpc>
+                <a:spcPct val="90000"/>
+              </a:lnSpc>
+              <a:spcBef>
+                <a:spcPts val="500"/>
+              </a:spcBef>
+              <a:buFont typeface="Arial" panose="020B0604020202020204" pitchFamily="34" charset="0"/>
+              <a:buChar char="•"/>
+              <a:defRPr sz="1800" kern="1200">
+                <a:solidFill>
+                  <a:schemeClr val="tx1"/>
+                </a:solidFill>
+                <a:latin typeface="+mn-lt"/>
+                <a:ea typeface="+mn-ea"/>
+                <a:cs typeface="+mn-cs"/>
+              </a:defRPr>
+            </a:lvl6pPr>
+            <a:lvl7pPr marL="2971800" indent="-228600" algn="l" defTabSz="914400" rtl="0" eaLnBrk="1" latinLnBrk="0" hangingPunct="1">
+              <a:lnSpc>
+                <a:spcPct val="90000"/>
+              </a:lnSpc>
+              <a:spcBef>
+                <a:spcPts val="500"/>
+              </a:spcBef>
+              <a:buFont typeface="Arial" panose="020B0604020202020204" pitchFamily="34" charset="0"/>
+              <a:buChar char="•"/>
+              <a:defRPr sz="1800" kern="1200">
+                <a:solidFill>
+                  <a:schemeClr val="tx1"/>
+                </a:solidFill>
+                <a:latin typeface="+mn-lt"/>
+                <a:ea typeface="+mn-ea"/>
+                <a:cs typeface="+mn-cs"/>
+              </a:defRPr>
+            </a:lvl7pPr>
+            <a:lvl8pPr marL="3429000" indent="-228600" algn="l" defTabSz="914400" rtl="0" eaLnBrk="1" latinLnBrk="0" hangingPunct="1">
+              <a:lnSpc>
+                <a:spcPct val="90000"/>
+              </a:lnSpc>
+              <a:spcBef>
+                <a:spcPts val="500"/>
+              </a:spcBef>
+              <a:buFont typeface="Arial" panose="020B0604020202020204" pitchFamily="34" charset="0"/>
+              <a:buChar char="•"/>
+              <a:defRPr sz="1800" kern="1200">
+                <a:solidFill>
+                  <a:schemeClr val="tx1"/>
+                </a:solidFill>
+                <a:latin typeface="+mn-lt"/>
+                <a:ea typeface="+mn-ea"/>
+                <a:cs typeface="+mn-cs"/>
+              </a:defRPr>
+            </a:lvl8pPr>
+            <a:lvl9pPr marL="3886200" indent="-228600" algn="l" defTabSz="914400" rtl="0" eaLnBrk="1" latinLnBrk="0" hangingPunct="1">
+              <a:lnSpc>
+                <a:spcPct val="90000"/>
+              </a:lnSpc>
+              <a:spcBef>
+                <a:spcPts val="500"/>
+              </a:spcBef>
+              <a:buFont typeface="Arial" panose="020B0604020202020204" pitchFamily="34" charset="0"/>
+              <a:buChar char="•"/>
+              <a:defRPr sz="1800" kern="1200">
+                <a:solidFill>
+                  <a:schemeClr val="tx1"/>
+                </a:solidFill>
+                <a:latin typeface="+mn-lt"/>
+                <a:ea typeface="+mn-ea"/>
+                <a:cs typeface="+mn-cs"/>
+              </a:defRPr>
+            </a:lvl9pPr>
+          </a:lstStyle>
+          <a:p>
+            <a:r>
+              <a:rPr lang="en-US" dirty="0"/>
+              <a:t>YIELD_NAME=="</a:t>
+            </a:r>
+            <a:r>
+              <a:rPr lang="en-US" dirty="0" err="1"/>
+              <a:t>activity_coefficient</a:t>
+            </a:r>
+            <a:r>
+              <a:rPr lang="en-US" dirty="0"/>
+              <a:t>“</a:t>
+            </a:r>
+          </a:p>
+          <a:p>
+            <a:pPr lvl="1"/>
+            <a:r>
+              <a:rPr lang="en-US" dirty="0"/>
+              <a:t>173 rows</a:t>
+            </a:r>
+          </a:p>
+          <a:p>
+            <a:pPr lvl="1"/>
+            <a:r>
+              <a:rPr lang="en-US" dirty="0"/>
+              <a:t>108 rows without NA</a:t>
+            </a:r>
+          </a:p>
+          <a:p>
+            <a:pPr lvl="1"/>
+            <a:r>
+              <a:rPr lang="en-US" dirty="0"/>
+              <a:t>96 of them existing in </a:t>
+            </a:r>
+            <a:r>
+              <a:rPr lang="en-US" dirty="0" err="1"/>
+              <a:t>Batch_Genealogy</a:t>
+            </a:r>
+            <a:endParaRPr lang="en-US" dirty="0"/>
+          </a:p>
+          <a:p>
+            <a:endParaRPr lang="en-US" dirty="0"/>
+          </a:p>
+        </p:txBody>
+      </p:sp>
+    </p:spTree>
+    <p:extLst>
+      <p:ext uri="{BB962C8B-B14F-4D97-AF65-F5344CB8AC3E}">
+        <p14:creationId xmlns:p14="http://schemas.microsoft.com/office/powerpoint/2010/main" val="1582892335"/>
+      </p:ext>
+    </p:extLst>
+  </p:cSld>
+  <p:clrMapOvr>
+    <a:masterClrMapping/>
+  </p:clrMapOvr>
+</p:sld>
+</file>
+
+<file path=ppt/slides/slide4.xml><?xml version="1.0" encoding="utf-8"?>
+<p:sld xmlns:a="http://schemas.openxmlformats.org/drawingml/2006/main" xmlns:r="http://schemas.openxmlformats.org/officeDocument/2006/relationships" xmlns:p="http://schemas.openxmlformats.org/presentationml/2006/main">
+  <p:cSld>
+    <p:spTree>
+      <p:nvGrpSpPr>
+        <p:cNvPr id="1" name=""/>
+        <p:cNvGrpSpPr/>
+        <p:nvPr/>
+      </p:nvGrpSpPr>
+      <p:grpSpPr>
+        <a:xfrm>
+          <a:off x="0" y="0"/>
+          <a:ext cx="0" cy="0"/>
+          <a:chOff x="0" y="0"/>
+          <a:chExt cx="0" cy="0"/>
+        </a:xfrm>
+      </p:grpSpPr>
+      <p:pic>
+        <p:nvPicPr>
+          <p:cNvPr id="5" name="Picture 4">
+            <a:extLst>
+              <a:ext uri="{FF2B5EF4-FFF2-40B4-BE49-F238E27FC236}">
+                <a16:creationId xmlns:a16="http://schemas.microsoft.com/office/drawing/2014/main" id="{79CC7AAC-AB81-8291-5BB7-C9DF6CA2D45C}"/>
+              </a:ext>
+            </a:extLst>
+          </p:cNvPr>
+          <p:cNvPicPr>
+            <a:picLocks noChangeAspect="1"/>
+          </p:cNvPicPr>
+          <p:nvPr/>
+        </p:nvPicPr>
+        <p:blipFill>
+          <a:blip r:embed="rId3"/>
+          <a:stretch>
+            <a:fillRect/>
+          </a:stretch>
+        </p:blipFill>
+        <p:spPr>
+          <a:xfrm>
+            <a:off x="100012" y="2566987"/>
+            <a:ext cx="4921023" cy="3948969"/>
+          </a:xfrm>
+          <a:prstGeom prst="rect">
+            <a:avLst/>
+          </a:prstGeom>
+        </p:spPr>
+      </p:pic>
+      <p:pic>
+        <p:nvPicPr>
+          <p:cNvPr id="7" name="Picture 6">
+            <a:extLst>
+              <a:ext uri="{FF2B5EF4-FFF2-40B4-BE49-F238E27FC236}">
+                <a16:creationId xmlns:a16="http://schemas.microsoft.com/office/drawing/2014/main" id="{D044D73E-31CD-225C-B17C-C89B768CD52C}"/>
+              </a:ext>
+            </a:extLst>
+          </p:cNvPr>
+          <p:cNvPicPr>
+            <a:picLocks noChangeAspect="1"/>
+          </p:cNvPicPr>
+          <p:nvPr/>
+        </p:nvPicPr>
+        <p:blipFill>
+          <a:blip r:embed="rId4"/>
+          <a:stretch>
+            <a:fillRect/>
+          </a:stretch>
+        </p:blipFill>
+        <p:spPr>
+          <a:xfrm>
+            <a:off x="8535763" y="185737"/>
+            <a:ext cx="2999012" cy="2624136"/>
+          </a:xfrm>
+          <a:prstGeom prst="rect">
+            <a:avLst/>
+          </a:prstGeom>
+        </p:spPr>
+      </p:pic>
+      <p:pic>
+        <p:nvPicPr>
+          <p:cNvPr id="9" name="Picture 8">
+            <a:extLst>
+              <a:ext uri="{FF2B5EF4-FFF2-40B4-BE49-F238E27FC236}">
+                <a16:creationId xmlns:a16="http://schemas.microsoft.com/office/drawing/2014/main" id="{B839689D-20B4-1AF0-5C17-873FE26CF0CC}"/>
+              </a:ext>
+            </a:extLst>
+          </p:cNvPr>
+          <p:cNvPicPr>
+            <a:picLocks noChangeAspect="1"/>
+          </p:cNvPicPr>
+          <p:nvPr/>
+        </p:nvPicPr>
+        <p:blipFill>
+          <a:blip r:embed="rId5"/>
+          <a:stretch>
+            <a:fillRect/>
+          </a:stretch>
+        </p:blipFill>
+        <p:spPr>
+          <a:xfrm>
+            <a:off x="5135336" y="185736"/>
+            <a:ext cx="2999014" cy="2624137"/>
+          </a:xfrm>
+          <a:prstGeom prst="rect">
+            <a:avLst/>
+          </a:prstGeom>
+        </p:spPr>
+      </p:pic>
+      <p:sp>
+        <p:nvSpPr>
+          <p:cNvPr id="10" name="TextBox 9">
+            <a:extLst>
+              <a:ext uri="{FF2B5EF4-FFF2-40B4-BE49-F238E27FC236}">
+                <a16:creationId xmlns:a16="http://schemas.microsoft.com/office/drawing/2014/main" id="{82F0577E-0523-B97C-0E96-E7E599C963C4}"/>
+              </a:ext>
+            </a:extLst>
+          </p:cNvPr>
+          <p:cNvSpPr txBox="1"/>
+          <p:nvPr/>
+        </p:nvSpPr>
+        <p:spPr>
+          <a:xfrm>
+            <a:off x="5251622" y="3333750"/>
+            <a:ext cx="6647935" cy="2585323"/>
+          </a:xfrm>
+          <a:prstGeom prst="rect">
+            <a:avLst/>
+          </a:prstGeom>
+          <a:noFill/>
+        </p:spPr>
+        <p:txBody>
+          <a:bodyPr wrap="square" rtlCol="0">
+            <a:spAutoFit/>
+          </a:bodyPr>
+          <a:lstStyle/>
+          <a:p>
+            <a:r>
+              <a:rPr lang="en-US" dirty="0"/>
+              <a:t>My target variable distribution can give idea about what kind of models that I can build.</a:t>
+            </a:r>
+          </a:p>
+          <a:p>
+            <a:r>
+              <a:rPr lang="en-US" dirty="0"/>
+              <a:t>It is not a normal distribution. It is a bimodal distribution, it has two peaks</a:t>
+            </a:r>
+          </a:p>
+          <a:p>
+            <a:pPr marL="285750" indent="-285750">
+              <a:buFont typeface="Arial" panose="020B0604020202020204" pitchFamily="34" charset="0"/>
+              <a:buChar char="•"/>
+            </a:pPr>
+            <a:r>
+              <a:rPr lang="en-US" dirty="0"/>
+              <a:t>Non-parametric Models: decision trees, random forests, support vector machines, and neural networks. These models can capture complex relationships without explicitly assuming a specific distribution</a:t>
+            </a:r>
+          </a:p>
+          <a:p>
+            <a:pPr marL="285750" indent="-285750">
+              <a:buFont typeface="Arial" panose="020B0604020202020204" pitchFamily="34" charset="0"/>
+              <a:buChar char="•"/>
+            </a:pPr>
+            <a:r>
+              <a:rPr lang="en-US" dirty="0"/>
+              <a:t>Generalized Linear Models (GLMs): Logistic Regression</a:t>
+            </a:r>
+          </a:p>
+        </p:txBody>
+      </p:sp>
+    </p:spTree>
+    <p:extLst>
+      <p:ext uri="{BB962C8B-B14F-4D97-AF65-F5344CB8AC3E}">
+        <p14:creationId xmlns:p14="http://schemas.microsoft.com/office/powerpoint/2010/main" val="1948043362"/>
+      </p:ext>
+    </p:extLst>
+  </p:cSld>
+  <p:clrMapOvr>
+    <a:masterClrMapping/>
+  </p:clrMapOvr>
+</p:sld>
+</file>
+
+<file path=ppt/slides/slide5.xml><?xml version="1.0" encoding="utf-8"?>
+<p:sld xmlns:a="http://schemas.openxmlformats.org/drawingml/2006/main" xmlns:r="http://schemas.openxmlformats.org/officeDocument/2006/relationships" xmlns:p="http://schemas.openxmlformats.org/presentationml/2006/main">
+  <p:cSld>
+    <p:spTree>
+      <p:nvGrpSpPr>
+        <p:cNvPr id="1" name=""/>
+        <p:cNvGrpSpPr/>
+        <p:nvPr/>
+      </p:nvGrpSpPr>
+      <p:grpSpPr>
+        <a:xfrm>
+          <a:off x="0" y="0"/>
+          <a:ext cx="0" cy="0"/>
+          <a:chOff x="0" y="0"/>
+          <a:chExt cx="0" cy="0"/>
+        </a:xfrm>
+      </p:grpSpPr>
+      <p:pic>
+        <p:nvPicPr>
+          <p:cNvPr id="7" name="Picture 6">
+            <a:extLst>
+              <a:ext uri="{FF2B5EF4-FFF2-40B4-BE49-F238E27FC236}">
+                <a16:creationId xmlns:a16="http://schemas.microsoft.com/office/drawing/2014/main" id="{B4764E19-C873-1BB9-5D0A-FD267AD44C03}"/>
+              </a:ext>
+            </a:extLst>
+          </p:cNvPr>
+          <p:cNvPicPr>
+            <a:picLocks noChangeAspect="1"/>
+          </p:cNvPicPr>
+          <p:nvPr/>
+        </p:nvPicPr>
+        <p:blipFill rotWithShape="1">
+          <a:blip r:embed="rId2"/>
+          <a:srcRect l="24223" t="14610" r="29561" b="34070"/>
+          <a:stretch/>
+        </p:blipFill>
+        <p:spPr>
+          <a:xfrm>
+            <a:off x="584886" y="729048"/>
+            <a:ext cx="5634681" cy="3323967"/>
+          </a:xfrm>
+          <a:prstGeom prst="rect">
+            <a:avLst/>
+          </a:prstGeom>
+        </p:spPr>
+      </p:pic>
+      <p:sp>
+        <p:nvSpPr>
+          <p:cNvPr id="8" name="TextBox 7">
+            <a:extLst>
+              <a:ext uri="{FF2B5EF4-FFF2-40B4-BE49-F238E27FC236}">
+                <a16:creationId xmlns:a16="http://schemas.microsoft.com/office/drawing/2014/main" id="{CA4FE683-F663-CFB4-1D15-8889244F76BC}"/>
+              </a:ext>
+            </a:extLst>
+          </p:cNvPr>
+          <p:cNvSpPr txBox="1"/>
+          <p:nvPr/>
+        </p:nvSpPr>
+        <p:spPr>
+          <a:xfrm>
+            <a:off x="6886083" y="959870"/>
+            <a:ext cx="4522573" cy="2862322"/>
+          </a:xfrm>
+          <a:prstGeom prst="rect">
+            <a:avLst/>
+          </a:prstGeom>
+          <a:noFill/>
+        </p:spPr>
+        <p:txBody>
+          <a:bodyPr wrap="square" rtlCol="0">
+            <a:spAutoFit/>
+          </a:bodyPr>
+          <a:lstStyle/>
+          <a:p>
+            <a:r>
+              <a:rPr lang="en-US" dirty="0"/>
+              <a:t>Shape: 428978 rows × 6 columns</a:t>
+            </a:r>
+          </a:p>
+          <a:p>
+            <a:r>
+              <a:rPr lang="en-US" dirty="0"/>
+              <a:t># of unique test: 74</a:t>
+            </a:r>
+          </a:p>
+          <a:p>
+            <a:r>
+              <a:rPr lang="en-US" dirty="0"/>
+              <a:t># of rows which have value: 56010</a:t>
+            </a:r>
+          </a:p>
+          <a:p>
+            <a:endParaRPr lang="en-US" dirty="0"/>
+          </a:p>
+          <a:p>
+            <a:r>
+              <a:rPr lang="en-US" dirty="0"/>
+              <a:t>It has QC test results for both input and output production unit.</a:t>
+            </a:r>
+          </a:p>
+          <a:p>
+            <a:endParaRPr lang="en-US" dirty="0"/>
+          </a:p>
+          <a:p>
+            <a:r>
+              <a:rPr lang="en-US" dirty="0"/>
+              <a:t>Weighted QC attributes needed for output production units.</a:t>
+            </a:r>
+          </a:p>
+          <a:p>
+            <a:endParaRPr lang="en-US" dirty="0"/>
+          </a:p>
+        </p:txBody>
+      </p:sp>
+      <p:sp>
+        <p:nvSpPr>
+          <p:cNvPr id="9" name="TextBox 8">
+            <a:extLst>
+              <a:ext uri="{FF2B5EF4-FFF2-40B4-BE49-F238E27FC236}">
+                <a16:creationId xmlns:a16="http://schemas.microsoft.com/office/drawing/2014/main" id="{C11C18B2-81CF-40DA-AF15-B739ED08D9AA}"/>
+              </a:ext>
+            </a:extLst>
+          </p:cNvPr>
+          <p:cNvSpPr txBox="1"/>
+          <p:nvPr/>
+        </p:nvSpPr>
+        <p:spPr>
+          <a:xfrm>
+            <a:off x="584886" y="183982"/>
+            <a:ext cx="1322173" cy="369332"/>
+          </a:xfrm>
+          <a:prstGeom prst="rect">
+            <a:avLst/>
+          </a:prstGeom>
+          <a:noFill/>
+        </p:spPr>
+        <p:txBody>
+          <a:bodyPr wrap="square" rtlCol="0">
+            <a:spAutoFit/>
+          </a:bodyPr>
+          <a:lstStyle/>
+          <a:p>
+            <a:r>
+              <a:rPr lang="en-US" dirty="0" err="1"/>
+              <a:t>QC_Data</a:t>
+            </a:r>
+            <a:endParaRPr lang="en-US" dirty="0"/>
           </a:p>
         </p:txBody>
       </p:sp>
@@ -6938,7 +7992,193 @@
 </p:sld>
 </file>
 
-<file path=ppt/slides/slide4.xml><?xml version="1.0" encoding="utf-8"?>
+<file path=ppt/slides/slide6.xml><?xml version="1.0" encoding="utf-8"?>
+<p:sld xmlns:a="http://schemas.openxmlformats.org/drawingml/2006/main" xmlns:r="http://schemas.openxmlformats.org/officeDocument/2006/relationships" xmlns:p="http://schemas.openxmlformats.org/presentationml/2006/main">
+  <p:cSld>
+    <p:spTree>
+      <p:nvGrpSpPr>
+        <p:cNvPr id="1" name=""/>
+        <p:cNvGrpSpPr/>
+        <p:nvPr/>
+      </p:nvGrpSpPr>
+      <p:grpSpPr>
+        <a:xfrm>
+          <a:off x="0" y="0"/>
+          <a:ext cx="0" cy="0"/>
+          <a:chOff x="0" y="0"/>
+          <a:chExt cx="0" cy="0"/>
+        </a:xfrm>
+      </p:grpSpPr>
+      <p:sp>
+        <p:nvSpPr>
+          <p:cNvPr id="8" name="TextBox 7">
+            <a:extLst>
+              <a:ext uri="{FF2B5EF4-FFF2-40B4-BE49-F238E27FC236}">
+                <a16:creationId xmlns:a16="http://schemas.microsoft.com/office/drawing/2014/main" id="{CA4FE683-F663-CFB4-1D15-8889244F76BC}"/>
+              </a:ext>
+            </a:extLst>
+          </p:cNvPr>
+          <p:cNvSpPr txBox="1"/>
+          <p:nvPr/>
+        </p:nvSpPr>
+        <p:spPr>
+          <a:xfrm>
+            <a:off x="584886" y="4278177"/>
+            <a:ext cx="5427987" cy="3139321"/>
+          </a:xfrm>
+          <a:prstGeom prst="rect">
+            <a:avLst/>
+          </a:prstGeom>
+          <a:noFill/>
+        </p:spPr>
+        <p:txBody>
+          <a:bodyPr wrap="square" rtlCol="0">
+            <a:spAutoFit/>
+          </a:bodyPr>
+          <a:lstStyle/>
+          <a:p>
+            <a:r>
+              <a:rPr lang="en-US" dirty="0"/>
+              <a:t>Shape: 4197 rows × 11 columns</a:t>
+            </a:r>
+          </a:p>
+          <a:p>
+            <a:r>
+              <a:rPr lang="en-US" dirty="0"/>
+              <a:t># of total input: 3781 </a:t>
+            </a:r>
+          </a:p>
+          <a:p>
+            <a:r>
+              <a:rPr lang="en-US" dirty="0"/>
+              <a:t># of total output: 208 </a:t>
+            </a:r>
+          </a:p>
+          <a:p>
+            <a:endParaRPr lang="en-US" dirty="0"/>
+          </a:p>
+          <a:p>
+            <a:endParaRPr lang="en-US" dirty="0"/>
+          </a:p>
+          <a:p>
+            <a:r>
+              <a:rPr lang="en-US" dirty="0"/>
+              <a:t># of unique production unit: 983</a:t>
+            </a:r>
+          </a:p>
+          <a:p>
+            <a:r>
+              <a:rPr lang="en-US" dirty="0"/>
+              <a:t># of unique input: 886</a:t>
+            </a:r>
+          </a:p>
+          <a:p>
+            <a:r>
+              <a:rPr lang="en-US" dirty="0"/>
+              <a:t># of unique output: 97</a:t>
+            </a:r>
+          </a:p>
+          <a:p>
+            <a:r>
+              <a:rPr lang="en-US" dirty="0"/>
+              <a:t>Length of intersection with </a:t>
+            </a:r>
+            <a:r>
+              <a:rPr lang="en-US" dirty="0" err="1"/>
+              <a:t>Combined_Yields</a:t>
+            </a:r>
+            <a:r>
+              <a:rPr lang="en-US" dirty="0"/>
+              <a:t> output: 96</a:t>
+            </a:r>
+          </a:p>
+          <a:p>
+            <a:endParaRPr lang="en-US" dirty="0"/>
+          </a:p>
+          <a:p>
+            <a:endParaRPr lang="en-US" dirty="0"/>
+          </a:p>
+        </p:txBody>
+      </p:sp>
+      <p:sp>
+        <p:nvSpPr>
+          <p:cNvPr id="9" name="TextBox 8">
+            <a:extLst>
+              <a:ext uri="{FF2B5EF4-FFF2-40B4-BE49-F238E27FC236}">
+                <a16:creationId xmlns:a16="http://schemas.microsoft.com/office/drawing/2014/main" id="{C11C18B2-81CF-40DA-AF15-B739ED08D9AA}"/>
+              </a:ext>
+            </a:extLst>
+          </p:cNvPr>
+          <p:cNvSpPr txBox="1"/>
+          <p:nvPr/>
+        </p:nvSpPr>
+        <p:spPr>
+          <a:xfrm>
+            <a:off x="584886" y="183982"/>
+            <a:ext cx="2207741" cy="369332"/>
+          </a:xfrm>
+          <a:prstGeom prst="rect">
+            <a:avLst/>
+          </a:prstGeom>
+          <a:noFill/>
+        </p:spPr>
+        <p:txBody>
+          <a:bodyPr wrap="square" rtlCol="0">
+            <a:spAutoFit/>
+          </a:bodyPr>
+          <a:lstStyle/>
+          <a:p>
+            <a:r>
+              <a:rPr lang="en-US" dirty="0" err="1"/>
+              <a:t>Batch_Genealogy</a:t>
+            </a:r>
+            <a:endParaRPr lang="en-US" dirty="0"/>
+          </a:p>
+        </p:txBody>
+      </p:sp>
+      <p:pic>
+        <p:nvPicPr>
+          <p:cNvPr id="3" name="Picture 2">
+            <a:extLst>
+              <a:ext uri="{FF2B5EF4-FFF2-40B4-BE49-F238E27FC236}">
+                <a16:creationId xmlns:a16="http://schemas.microsoft.com/office/drawing/2014/main" id="{2ACB5F2B-897D-FF1B-5D4B-42034E904267}"/>
+              </a:ext>
+            </a:extLst>
+          </p:cNvPr>
+          <p:cNvPicPr>
+            <a:picLocks noChangeAspect="1"/>
+          </p:cNvPicPr>
+          <p:nvPr/>
+        </p:nvPicPr>
+        <p:blipFill rotWithShape="1">
+          <a:blip r:embed="rId2"/>
+          <a:srcRect l="24020" t="32734" b="15946"/>
+          <a:stretch/>
+        </p:blipFill>
+        <p:spPr>
+          <a:xfrm>
+            <a:off x="667264" y="753762"/>
+            <a:ext cx="9263449" cy="3323967"/>
+          </a:xfrm>
+          <a:prstGeom prst="rect">
+            <a:avLst/>
+          </a:prstGeom>
+        </p:spPr>
+      </p:pic>
+    </p:spTree>
+    <p:extLst>
+      <p:ext uri="{BB962C8B-B14F-4D97-AF65-F5344CB8AC3E}">
+        <p14:creationId xmlns:p14="http://schemas.microsoft.com/office/powerpoint/2010/main" val="1101182029"/>
+      </p:ext>
+    </p:extLst>
+  </p:cSld>
+  <p:clrMapOvr>
+    <a:masterClrMapping/>
+  </p:clrMapOvr>
+</p:sld>
+</file>
+
+<file path=ppt/slides/slide7.xml><?xml version="1.0" encoding="utf-8"?>
 <p:sld xmlns:a="http://schemas.openxmlformats.org/drawingml/2006/main" xmlns:r="http://schemas.openxmlformats.org/officeDocument/2006/relationships" xmlns:p="http://schemas.openxmlformats.org/presentationml/2006/main">
   <p:cSld>
     <p:spTree>
@@ -7331,4 +8571,299 @@
     </a:ext>
   </a:extLst>
 </a:theme>
+</file>
+
+<file path=ppt/theme/theme2.xml><?xml version="1.0" encoding="utf-8"?>
+<a:theme xmlns:a="http://schemas.openxmlformats.org/drawingml/2006/main" name="Office Theme">
+  <a:themeElements>
+    <a:clrScheme name="Office">
+      <a:dk1>
+        <a:sysClr val="windowText" lastClr="000000"/>
+      </a:dk1>
+      <a:lt1>
+        <a:sysClr val="window" lastClr="FFFFFF"/>
+      </a:lt1>
+      <a:dk2>
+        <a:srgbClr val="44546A"/>
+      </a:dk2>
+      <a:lt2>
+        <a:srgbClr val="E7E6E6"/>
+      </a:lt2>
+      <a:accent1>
+        <a:srgbClr val="4472C4"/>
+      </a:accent1>
+      <a:accent2>
+        <a:srgbClr val="ED7D31"/>
+      </a:accent2>
+      <a:accent3>
+        <a:srgbClr val="A5A5A5"/>
+      </a:accent3>
+      <a:accent4>
+        <a:srgbClr val="FFC000"/>
+      </a:accent4>
+      <a:accent5>
+        <a:srgbClr val="5B9BD5"/>
+      </a:accent5>
+      <a:accent6>
+        <a:srgbClr val="70AD47"/>
+      </a:accent6>
+      <a:hlink>
+        <a:srgbClr val="0563C1"/>
+      </a:hlink>
+      <a:folHlink>
+        <a:srgbClr val="954F72"/>
+      </a:folHlink>
+    </a:clrScheme>
+    <a:fontScheme name="Office">
+      <a:majorFont>
+        <a:latin typeface="Calibri Light" panose="020F0302020204030204"/>
+        <a:ea typeface=""/>
+        <a:cs typeface=""/>
+        <a:font script="Jpan" typeface="游ゴシック Light"/>
+        <a:font script="Hang" typeface="맑은 고딕"/>
+        <a:font script="Hans" typeface="等线 Light"/>
+        <a:font script="Hant" typeface="新細明體"/>
+        <a:font script="Arab" typeface="Times New Roman"/>
+        <a:font script="Hebr" typeface="Times New Roman"/>
+        <a:font script="Thai" typeface="Angsana New"/>
+        <a:font script="Ethi" typeface="Nyala"/>
+        <a:font script="Beng" typeface="Vrinda"/>
+        <a:font script="Gujr" typeface="Shruti"/>
+        <a:font script="Khmr" typeface="MoolBoran"/>
+        <a:font script="Knda" typeface="Tunga"/>
+        <a:font script="Guru" typeface="Raavi"/>
+        <a:font script="Cans" typeface="Euphemia"/>
+        <a:font script="Cher" typeface="Plantagenet Cherokee"/>
+        <a:font script="Yiii" typeface="Microsoft Yi Baiti"/>
+        <a:font script="Tibt" typeface="Microsoft Himalaya"/>
+        <a:font script="Thaa" typeface="MV Boli"/>
+        <a:font script="Deva" typeface="Mangal"/>
+        <a:font script="Telu" typeface="Gautami"/>
+        <a:font script="Taml" typeface="Latha"/>
+        <a:font script="Syrc" typeface="Estrangelo Edessa"/>
+        <a:font script="Orya" typeface="Kalinga"/>
+        <a:font script="Mlym" typeface="Kartika"/>
+        <a:font script="Laoo" typeface="DokChampa"/>
+        <a:font script="Sinh" typeface="Iskoola Pota"/>
+        <a:font script="Mong" typeface="Mongolian Baiti"/>
+        <a:font script="Viet" typeface="Times New Roman"/>
+        <a:font script="Uigh" typeface="Microsoft Uighur"/>
+        <a:font script="Geor" typeface="Sylfaen"/>
+        <a:font script="Armn" typeface="Arial"/>
+        <a:font script="Bugi" typeface="Leelawadee UI"/>
+        <a:font script="Bopo" typeface="Microsoft JhengHei"/>
+        <a:font script="Java" typeface="Javanese Text"/>
+        <a:font script="Lisu" typeface="Segoe UI"/>
+        <a:font script="Mymr" typeface="Myanmar Text"/>
+        <a:font script="Nkoo" typeface="Ebrima"/>
+        <a:font script="Olck" typeface="Nirmala UI"/>
+        <a:font script="Osma" typeface="Ebrima"/>
+        <a:font script="Phag" typeface="Phagspa"/>
+        <a:font script="Syrn" typeface="Estrangelo Edessa"/>
+        <a:font script="Syrj" typeface="Estrangelo Edessa"/>
+        <a:font script="Syre" typeface="Estrangelo Edessa"/>
+        <a:font script="Sora" typeface="Nirmala UI"/>
+        <a:font script="Tale" typeface="Microsoft Tai Le"/>
+        <a:font script="Talu" typeface="Microsoft New Tai Lue"/>
+        <a:font script="Tfng" typeface="Ebrima"/>
+      </a:majorFont>
+      <a:minorFont>
+        <a:latin typeface="Calibri" panose="020F0502020204030204"/>
+        <a:ea typeface=""/>
+        <a:cs typeface=""/>
+        <a:font script="Jpan" typeface="游ゴシック"/>
+        <a:font script="Hang" typeface="맑은 고딕"/>
+        <a:font script="Hans" typeface="等线"/>
+        <a:font script="Hant" typeface="新細明體"/>
+        <a:font script="Arab" typeface="Arial"/>
+        <a:font script="Hebr" typeface="Arial"/>
+        <a:font script="Thai" typeface="Cordia New"/>
+        <a:font script="Ethi" typeface="Nyala"/>
+        <a:font script="Beng" typeface="Vrinda"/>
+        <a:font script="Gujr" typeface="Shruti"/>
+        <a:font script="Khmr" typeface="DaunPenh"/>
+        <a:font script="Knda" typeface="Tunga"/>
+        <a:font script="Guru" typeface="Raavi"/>
+        <a:font script="Cans" typeface="Euphemia"/>
+        <a:font script="Cher" typeface="Plantagenet Cherokee"/>
+        <a:font script="Yiii" typeface="Microsoft Yi Baiti"/>
+        <a:font script="Tibt" typeface="Microsoft Himalaya"/>
+        <a:font script="Thaa" typeface="MV Boli"/>
+        <a:font script="Deva" typeface="Mangal"/>
+        <a:font script="Telu" typeface="Gautami"/>
+        <a:font script="Taml" typeface="Latha"/>
+        <a:font script="Syrc" typeface="Estrangelo Edessa"/>
+        <a:font script="Orya" typeface="Kalinga"/>
+        <a:font script="Mlym" typeface="Kartika"/>
+        <a:font script="Laoo" typeface="DokChampa"/>
+        <a:font script="Sinh" typeface="Iskoola Pota"/>
+        <a:font script="Mong" typeface="Mongolian Baiti"/>
+        <a:font script="Viet" typeface="Arial"/>
+        <a:font script="Uigh" typeface="Microsoft Uighur"/>
+        <a:font script="Geor" typeface="Sylfaen"/>
+        <a:font script="Armn" typeface="Arial"/>
+        <a:font script="Bugi" typeface="Leelawadee UI"/>
+        <a:font script="Bopo" typeface="Microsoft JhengHei"/>
+        <a:font script="Java" typeface="Javanese Text"/>
+        <a:font script="Lisu" typeface="Segoe UI"/>
+        <a:font script="Mymr" typeface="Myanmar Text"/>
+        <a:font script="Nkoo" typeface="Ebrima"/>
+        <a:font script="Olck" typeface="Nirmala UI"/>
+        <a:font script="Osma" typeface="Ebrima"/>
+        <a:font script="Phag" typeface="Phagspa"/>
+        <a:font script="Syrn" typeface="Estrangelo Edessa"/>
+        <a:font script="Syrj" typeface="Estrangelo Edessa"/>
+        <a:font script="Syre" typeface="Estrangelo Edessa"/>
+        <a:font script="Sora" typeface="Nirmala UI"/>
+        <a:font script="Tale" typeface="Microsoft Tai Le"/>
+        <a:font script="Talu" typeface="Microsoft New Tai Lue"/>
+        <a:font script="Tfng" typeface="Ebrima"/>
+      </a:minorFont>
+    </a:fontScheme>
+    <a:fmtScheme name="Office">
+      <a:fillStyleLst>
+        <a:solidFill>
+          <a:schemeClr val="phClr"/>
+        </a:solidFill>
+        <a:gradFill rotWithShape="1">
+          <a:gsLst>
+            <a:gs pos="0">
+              <a:schemeClr val="phClr">
+                <a:lumMod val="110000"/>
+                <a:satMod val="105000"/>
+                <a:tint val="67000"/>
+              </a:schemeClr>
+            </a:gs>
+            <a:gs pos="50000">
+              <a:schemeClr val="phClr">
+                <a:lumMod val="105000"/>
+                <a:satMod val="103000"/>
+                <a:tint val="73000"/>
+              </a:schemeClr>
+            </a:gs>
+            <a:gs pos="100000">
+              <a:schemeClr val="phClr">
+                <a:lumMod val="105000"/>
+                <a:satMod val="109000"/>
+                <a:tint val="81000"/>
+              </a:schemeClr>
+            </a:gs>
+          </a:gsLst>
+          <a:lin ang="5400000" scaled="0"/>
+        </a:gradFill>
+        <a:gradFill rotWithShape="1">
+          <a:gsLst>
+            <a:gs pos="0">
+              <a:schemeClr val="phClr">
+                <a:satMod val="103000"/>
+                <a:lumMod val="102000"/>
+                <a:tint val="94000"/>
+              </a:schemeClr>
+            </a:gs>
+            <a:gs pos="50000">
+              <a:schemeClr val="phClr">
+                <a:satMod val="110000"/>
+                <a:lumMod val="100000"/>
+                <a:shade val="100000"/>
+              </a:schemeClr>
+            </a:gs>
+            <a:gs pos="100000">
+              <a:schemeClr val="phClr">
+                <a:lumMod val="99000"/>
+                <a:satMod val="120000"/>
+                <a:shade val="78000"/>
+              </a:schemeClr>
+            </a:gs>
+          </a:gsLst>
+          <a:lin ang="5400000" scaled="0"/>
+        </a:gradFill>
+      </a:fillStyleLst>
+      <a:lnStyleLst>
+        <a:ln w="6350" cap="flat" cmpd="sng" algn="ctr">
+          <a:solidFill>
+            <a:schemeClr val="phClr"/>
+          </a:solidFill>
+          <a:prstDash val="solid"/>
+          <a:miter lim="800000"/>
+        </a:ln>
+        <a:ln w="12700" cap="flat" cmpd="sng" algn="ctr">
+          <a:solidFill>
+            <a:schemeClr val="phClr"/>
+          </a:solidFill>
+          <a:prstDash val="solid"/>
+          <a:miter lim="800000"/>
+        </a:ln>
+        <a:ln w="19050" cap="flat" cmpd="sng" algn="ctr">
+          <a:solidFill>
+            <a:schemeClr val="phClr"/>
+          </a:solidFill>
+          <a:prstDash val="solid"/>
+          <a:miter lim="800000"/>
+        </a:ln>
+      </a:lnStyleLst>
+      <a:effectStyleLst>
+        <a:effectStyle>
+          <a:effectLst/>
+        </a:effectStyle>
+        <a:effectStyle>
+          <a:effectLst/>
+        </a:effectStyle>
+        <a:effectStyle>
+          <a:effectLst>
+            <a:outerShdw blurRad="57150" dist="19050" dir="5400000" algn="ctr" rotWithShape="0">
+              <a:srgbClr val="000000">
+                <a:alpha val="63000"/>
+              </a:srgbClr>
+            </a:outerShdw>
+          </a:effectLst>
+        </a:effectStyle>
+      </a:effectStyleLst>
+      <a:bgFillStyleLst>
+        <a:solidFill>
+          <a:schemeClr val="phClr"/>
+        </a:solidFill>
+        <a:solidFill>
+          <a:schemeClr val="phClr">
+            <a:tint val="95000"/>
+            <a:satMod val="170000"/>
+          </a:schemeClr>
+        </a:solidFill>
+        <a:gradFill rotWithShape="1">
+          <a:gsLst>
+            <a:gs pos="0">
+              <a:schemeClr val="phClr">
+                <a:tint val="93000"/>
+                <a:satMod val="150000"/>
+                <a:shade val="98000"/>
+                <a:lumMod val="102000"/>
+              </a:schemeClr>
+            </a:gs>
+            <a:gs pos="50000">
+              <a:schemeClr val="phClr">
+                <a:tint val="98000"/>
+                <a:satMod val="130000"/>
+                <a:shade val="90000"/>
+                <a:lumMod val="103000"/>
+              </a:schemeClr>
+            </a:gs>
+            <a:gs pos="100000">
+              <a:schemeClr val="phClr">
+                <a:shade val="63000"/>
+                <a:satMod val="120000"/>
+              </a:schemeClr>
+            </a:gs>
+          </a:gsLst>
+          <a:lin ang="5400000" scaled="0"/>
+        </a:gradFill>
+      </a:bgFillStyleLst>
+    </a:fmtScheme>
+  </a:themeElements>
+  <a:objectDefaults/>
+  <a:extraClrSchemeLst/>
+  <a:extLst>
+    <a:ext uri="{05A4C25C-085E-4340-85A3-A5531E510DB2}">
+      <thm15:themeFamily xmlns:thm15="http://schemas.microsoft.com/office/thememl/2012/main" name="Office Theme" id="{62F939B6-93AF-4DB8-9C6B-D6C7DFDC589F}" vid="{4A3C46E8-61CC-4603-A589-7422A47A8E4A}"/>
+    </a:ext>
+  </a:extLst>
+</a:theme>
 </file>
</xml_diff>